<commit_message>
PRESENTAZIONE AGGIUNTA UML CLIENT
</commit_message>
<xml_diff>
--- a/modelliUml/PRESENTAZIONE.pptx
+++ b/modelliUml/PRESENTAZIONE.pptx
@@ -20,12 +20,16 @@
     <p:sldId id="267" r:id="rId14"/>
     <p:sldId id="268" r:id="rId15"/>
     <p:sldId id="270" r:id="rId16"/>
-    <p:sldId id="271" r:id="rId17"/>
-    <p:sldId id="269" r:id="rId18"/>
-    <p:sldId id="272" r:id="rId19"/>
-    <p:sldId id="273" r:id="rId20"/>
-    <p:sldId id="274" r:id="rId21"/>
-    <p:sldId id="275" r:id="rId22"/>
+    <p:sldId id="277" r:id="rId17"/>
+    <p:sldId id="278" r:id="rId18"/>
+    <p:sldId id="279" r:id="rId19"/>
+    <p:sldId id="280" r:id="rId20"/>
+    <p:sldId id="271" r:id="rId21"/>
+    <p:sldId id="269" r:id="rId22"/>
+    <p:sldId id="272" r:id="rId23"/>
+    <p:sldId id="273" r:id="rId24"/>
+    <p:sldId id="274" r:id="rId25"/>
+    <p:sldId id="275" r:id="rId26"/>
   </p:sldIdLst>
   <p:sldSz cx="12192000" cy="6858000"/>
   <p:notesSz cx="6858000" cy="9144000"/>
@@ -6648,31 +6652,35 @@
           </a:p>
         </p:txBody>
       </p:sp>
-      <p:sp>
-        <p:nvSpPr>
-          <p:cNvPr id="3" name="Segnaposto contenuto 2">
+      <p:pic>
+        <p:nvPicPr>
+          <p:cNvPr id="5" name="Segnaposto contenuto 4">
             <a:extLst>
               <a:ext uri="{FF2B5EF4-FFF2-40B4-BE49-F238E27FC236}">
-                <a16:creationId xmlns:a16="http://schemas.microsoft.com/office/drawing/2014/main" id="{2BD68C5F-03B8-4005-BAEB-F9B09C554A35}"/>
+                <a16:creationId xmlns:a16="http://schemas.microsoft.com/office/drawing/2014/main" id="{416B1672-A3C4-4AD9-873C-D6C1DA36FB6D}"/>
               </a:ext>
             </a:extLst>
           </p:cNvPr>
-          <p:cNvSpPr>
-            <a:spLocks noGrp="1"/>
-          </p:cNvSpPr>
+          <p:cNvPicPr>
+            <a:picLocks noGrp="1" noChangeAspect="1"/>
+          </p:cNvPicPr>
           <p:nvPr>
             <p:ph idx="1"/>
           </p:nvPr>
-        </p:nvSpPr>
-        <p:spPr/>
-        <p:txBody>
-          <a:bodyPr/>
-          <a:lstStyle/>
-          <a:p>
-            <a:endParaRPr lang="it-IT" dirty="0"/>
-          </a:p>
-        </p:txBody>
-      </p:sp>
+        </p:nvPicPr>
+        <p:blipFill>
+          <a:blip r:embed="rId2"/>
+          <a:stretch>
+            <a:fillRect/>
+          </a:stretch>
+        </p:blipFill>
+        <p:spPr>
+          <a:xfrm>
+            <a:off x="2446215" y="1711570"/>
+            <a:ext cx="7057293" cy="4790830"/>
+          </a:xfrm>
+        </p:spPr>
+      </p:pic>
     </p:spTree>
     <p:extLst>
       <p:ext uri="{BB962C8B-B14F-4D97-AF65-F5344CB8AC3E}">
@@ -6708,7 +6716,7 @@
           <p:cNvPr id="2" name="Titolo 1">
             <a:extLst>
               <a:ext uri="{FF2B5EF4-FFF2-40B4-BE49-F238E27FC236}">
-                <a16:creationId xmlns:a16="http://schemas.microsoft.com/office/drawing/2014/main" id="{2EE0991B-9F1E-41EB-80B5-3086B341D785}"/>
+                <a16:creationId xmlns:a16="http://schemas.microsoft.com/office/drawing/2014/main" id="{34EF5C4A-C68A-4270-B341-DDA786B88B73}"/>
               </a:ext>
             </a:extLst>
           </p:cNvPr>
@@ -6726,166 +6734,81 @@
           <a:p>
             <a:r>
               <a:rPr lang="it-IT" dirty="0"/>
-              <a:t>ARCHITETTURE IMPLEMENTATE</a:t>
-            </a:r>
-          </a:p>
-        </p:txBody>
-      </p:sp>
-      <p:sp>
-        <p:nvSpPr>
-          <p:cNvPr id="3" name="Segnaposto contenuto 2">
+              <a:t>DIAGRAMMA DELLE CLASSI</a:t>
+            </a:r>
+            <a:br>
+              <a:rPr lang="it-IT" dirty="0"/>
+            </a:br>
+            <a:r>
+              <a:rPr lang="it-IT" sz="2000" dirty="0"/>
+              <a:t>PACKAGE FONTS + PACKAGE CLIENTINTERFACE</a:t>
+            </a:r>
+          </a:p>
+        </p:txBody>
+      </p:sp>
+      <p:pic>
+        <p:nvPicPr>
+          <p:cNvPr id="5" name="Segnaposto contenuto 4">
             <a:extLst>
               <a:ext uri="{FF2B5EF4-FFF2-40B4-BE49-F238E27FC236}">
-                <a16:creationId xmlns:a16="http://schemas.microsoft.com/office/drawing/2014/main" id="{067BE700-B2BD-41C4-9F4F-7AC231A1885E}"/>
+                <a16:creationId xmlns:a16="http://schemas.microsoft.com/office/drawing/2014/main" id="{6C94A4C1-78EF-452C-82E0-66B94CEE7226}"/>
               </a:ext>
             </a:extLst>
           </p:cNvPr>
-          <p:cNvSpPr>
-            <a:spLocks noGrp="1"/>
-          </p:cNvSpPr>
+          <p:cNvPicPr>
+            <a:picLocks noGrp="1" noChangeAspect="1"/>
+          </p:cNvPicPr>
           <p:nvPr>
             <p:ph idx="1"/>
           </p:nvPr>
-        </p:nvSpPr>
+        </p:nvPicPr>
+        <p:blipFill>
+          <a:blip r:embed="rId2"/>
+          <a:stretch>
+            <a:fillRect/>
+          </a:stretch>
+        </p:blipFill>
         <p:spPr>
           <a:xfrm>
-            <a:off x="646112" y="1526960"/>
-            <a:ext cx="9403742" cy="4721440"/>
+            <a:off x="737699" y="1853248"/>
+            <a:ext cx="2523127" cy="4195762"/>
           </a:xfrm>
         </p:spPr>
-        <p:txBody>
-          <a:bodyPr>
-            <a:normAutofit/>
-          </a:bodyPr>
-          <a:lstStyle/>
-          <a:p>
-            <a:pPr marL="0" indent="0">
-              <a:buNone/>
-            </a:pPr>
-            <a:r>
-              <a:rPr lang="fr-FR" dirty="0"/>
-              <a:t>ARCHITETTURA CLIENT SERVER</a:t>
-            </a:r>
-          </a:p>
-          <a:p>
-            <a:r>
-              <a:rPr lang="fr-FR" dirty="0"/>
-              <a:t>client : @package </a:t>
-            </a:r>
-            <a:r>
-              <a:rPr lang="fr-FR" dirty="0" err="1"/>
-              <a:t>Client.Graphics</a:t>
-            </a:r>
-            <a:endParaRPr lang="fr-FR" dirty="0"/>
-          </a:p>
-          <a:p>
-            <a:r>
-              <a:rPr lang="fr-FR" dirty="0"/>
-              <a:t>server : @package </a:t>
-            </a:r>
-            <a:r>
-              <a:rPr lang="fr-FR" dirty="0" err="1"/>
-              <a:t>Server.GameClasses</a:t>
-            </a:r>
-            <a:r>
-              <a:rPr lang="fr-FR" dirty="0"/>
-              <a:t> </a:t>
-            </a:r>
-          </a:p>
-          <a:p>
-            <a:pPr marL="0" indent="0">
-              <a:buNone/>
-            </a:pPr>
-            <a:r>
-              <a:rPr lang="it-IT" dirty="0"/>
-              <a:t>ARCHITETTURA A STRATI</a:t>
-            </a:r>
-          </a:p>
-          <a:p>
-            <a:pPr marL="0" indent="0">
-              <a:buNone/>
-            </a:pPr>
-            <a:r>
-              <a:rPr lang="it-IT" dirty="0"/>
-              <a:t>all'interno del server :</a:t>
-            </a:r>
-          </a:p>
-          <a:p>
-            <a:r>
-              <a:rPr lang="it-IT" dirty="0"/>
-              <a:t> strato interfaccia al database : @package </a:t>
-            </a:r>
-            <a:r>
-              <a:rPr lang="it-IT" dirty="0" err="1"/>
-              <a:t>ConnectionDb</a:t>
-            </a:r>
-            <a:endParaRPr lang="it-IT" dirty="0"/>
-          </a:p>
-          <a:p>
-            <a:r>
-              <a:rPr lang="it-IT" dirty="0"/>
-              <a:t> strato di dominio : @</a:t>
-            </a:r>
-            <a:r>
-              <a:rPr lang="it-IT" dirty="0" err="1"/>
-              <a:t>paclage</a:t>
-            </a:r>
-            <a:r>
-              <a:rPr lang="it-IT" dirty="0"/>
-              <a:t> </a:t>
-            </a:r>
-            <a:r>
-              <a:rPr lang="it-IT" dirty="0" err="1"/>
-              <a:t>GameClasses</a:t>
-            </a:r>
-            <a:endParaRPr lang="it-IT" dirty="0"/>
-          </a:p>
-          <a:p>
-            <a:r>
-              <a:rPr lang="it-IT" dirty="0"/>
-              <a:t> strato di interfaccia con il client : @classi </a:t>
-            </a:r>
-            <a:r>
-              <a:rPr lang="it-IT" dirty="0" err="1"/>
-              <a:t>ServerInterface</a:t>
-            </a:r>
-            <a:r>
-              <a:rPr lang="it-IT" dirty="0"/>
-              <a:t> e Controller</a:t>
-            </a:r>
-          </a:p>
-          <a:p>
-            <a:pPr marL="0" indent="0">
-              <a:buNone/>
-            </a:pPr>
-            <a:r>
-              <a:rPr lang="it-IT" dirty="0"/>
-              <a:t>all'interno del client :</a:t>
-            </a:r>
-          </a:p>
-          <a:p>
-            <a:r>
-              <a:rPr lang="it-IT" dirty="0"/>
-              <a:t>strato di interfaccia utente : @tutte le classi in client</a:t>
-            </a:r>
-          </a:p>
-          <a:p>
-            <a:r>
-              <a:rPr lang="it-IT" dirty="0"/>
-              <a:t> strato di interfaccia con il server : @classe </a:t>
-            </a:r>
-            <a:r>
-              <a:rPr lang="it-IT" dirty="0" err="1"/>
-              <a:t>ClientInterface</a:t>
-            </a:r>
-            <a:endParaRPr lang="it-IT" dirty="0"/>
-          </a:p>
-        </p:txBody>
-      </p:sp>
+      </p:pic>
+      <p:pic>
+        <p:nvPicPr>
+          <p:cNvPr id="9" name="Immagine 8">
+            <a:extLst>
+              <a:ext uri="{FF2B5EF4-FFF2-40B4-BE49-F238E27FC236}">
+                <a16:creationId xmlns:a16="http://schemas.microsoft.com/office/drawing/2014/main" id="{086C7D86-4319-4B36-8856-BFD79B8F3FF0}"/>
+              </a:ext>
+            </a:extLst>
+          </p:cNvPr>
+          <p:cNvPicPr>
+            <a:picLocks noChangeAspect="1"/>
+          </p:cNvPicPr>
+          <p:nvPr/>
+        </p:nvPicPr>
+        <p:blipFill>
+          <a:blip r:embed="rId3"/>
+          <a:stretch>
+            <a:fillRect/>
+          </a:stretch>
+        </p:blipFill>
+        <p:spPr>
+          <a:xfrm>
+            <a:off x="3842162" y="1853248"/>
+            <a:ext cx="6790008" cy="3772227"/>
+          </a:xfrm>
+          <a:prstGeom prst="rect">
+            <a:avLst/>
+          </a:prstGeom>
+        </p:spPr>
+      </p:pic>
     </p:spTree>
     <p:extLst>
       <p:ext uri="{BB962C8B-B14F-4D97-AF65-F5344CB8AC3E}">
-        <p14:creationId xmlns:p14="http://schemas.microsoft.com/office/powerpoint/2010/main" val="17492253"/>
+        <p14:creationId xmlns:p14="http://schemas.microsoft.com/office/powerpoint/2010/main" val="3173839242"/>
       </p:ext>
     </p:extLst>
   </p:cSld>
@@ -6917,6 +6840,728 @@
           <p:cNvPr id="2" name="Titolo 1">
             <a:extLst>
               <a:ext uri="{FF2B5EF4-FFF2-40B4-BE49-F238E27FC236}">
+                <a16:creationId xmlns:a16="http://schemas.microsoft.com/office/drawing/2014/main" id="{34EF5C4A-C68A-4270-B341-DDA786B88B73}"/>
+              </a:ext>
+            </a:extLst>
+          </p:cNvPr>
+          <p:cNvSpPr>
+            <a:spLocks noGrp="1"/>
+          </p:cNvSpPr>
+          <p:nvPr>
+            <p:ph type="title"/>
+          </p:nvPr>
+        </p:nvSpPr>
+        <p:spPr/>
+        <p:txBody>
+          <a:bodyPr/>
+          <a:lstStyle/>
+          <a:p>
+            <a:r>
+              <a:rPr lang="it-IT" dirty="0"/>
+              <a:t>DIAGRAMMA DELLE CLASSI</a:t>
+            </a:r>
+            <a:br>
+              <a:rPr lang="it-IT" dirty="0"/>
+            </a:br>
+            <a:r>
+              <a:rPr lang="it-IT" sz="2000" dirty="0"/>
+              <a:t>PACKAGE PLAYER</a:t>
+            </a:r>
+          </a:p>
+        </p:txBody>
+      </p:sp>
+      <p:pic>
+        <p:nvPicPr>
+          <p:cNvPr id="10" name="Segnaposto contenuto 9">
+            <a:extLst>
+              <a:ext uri="{FF2B5EF4-FFF2-40B4-BE49-F238E27FC236}">
+                <a16:creationId xmlns:a16="http://schemas.microsoft.com/office/drawing/2014/main" id="{420C7B42-3CF2-49AC-B381-13F65645F11C}"/>
+              </a:ext>
+            </a:extLst>
+          </p:cNvPr>
+          <p:cNvPicPr>
+            <a:picLocks noGrp="1" noChangeAspect="1"/>
+          </p:cNvPicPr>
+          <p:nvPr>
+            <p:ph idx="1"/>
+          </p:nvPr>
+        </p:nvPicPr>
+        <p:blipFill>
+          <a:blip r:embed="rId2"/>
+          <a:stretch>
+            <a:fillRect/>
+          </a:stretch>
+        </p:blipFill>
+        <p:spPr>
+          <a:xfrm>
+            <a:off x="3600326" y="1552452"/>
+            <a:ext cx="4371366" cy="5063989"/>
+          </a:xfrm>
+        </p:spPr>
+      </p:pic>
+    </p:spTree>
+    <p:extLst>
+      <p:ext uri="{BB962C8B-B14F-4D97-AF65-F5344CB8AC3E}">
+        <p14:creationId xmlns:p14="http://schemas.microsoft.com/office/powerpoint/2010/main" val="1272888196"/>
+      </p:ext>
+    </p:extLst>
+  </p:cSld>
+  <p:clrMapOvr>
+    <a:masterClrMapping/>
+  </p:clrMapOvr>
+</p:sld>
+</file>
+
+<file path=ppt/slides/slide18.xml><?xml version="1.0" encoding="utf-8"?>
+<p:sld xmlns:a="http://schemas.openxmlformats.org/drawingml/2006/main" xmlns:r="http://schemas.openxmlformats.org/officeDocument/2006/relationships" xmlns:p="http://schemas.openxmlformats.org/presentationml/2006/main">
+  <p:cSld>
+    <p:spTree>
+      <p:nvGrpSpPr>
+        <p:cNvPr id="1" name=""/>
+        <p:cNvGrpSpPr/>
+        <p:nvPr/>
+      </p:nvGrpSpPr>
+      <p:grpSpPr>
+        <a:xfrm>
+          <a:off x="0" y="0"/>
+          <a:ext cx="0" cy="0"/>
+          <a:chOff x="0" y="0"/>
+          <a:chExt cx="0" cy="0"/>
+        </a:xfrm>
+      </p:grpSpPr>
+      <p:sp>
+        <p:nvSpPr>
+          <p:cNvPr id="2" name="Titolo 1">
+            <a:extLst>
+              <a:ext uri="{FF2B5EF4-FFF2-40B4-BE49-F238E27FC236}">
+                <a16:creationId xmlns:a16="http://schemas.microsoft.com/office/drawing/2014/main" id="{E7507B55-B251-417B-B073-6D6BB02EB34F}"/>
+              </a:ext>
+            </a:extLst>
+          </p:cNvPr>
+          <p:cNvSpPr>
+            <a:spLocks noGrp="1"/>
+          </p:cNvSpPr>
+          <p:nvPr>
+            <p:ph type="title"/>
+          </p:nvPr>
+        </p:nvSpPr>
+        <p:spPr/>
+        <p:txBody>
+          <a:bodyPr/>
+          <a:lstStyle/>
+          <a:p>
+            <a:r>
+              <a:rPr lang="it-IT" dirty="0"/>
+              <a:t>DIAGRAMMA DELLE CLASSI</a:t>
+            </a:r>
+            <a:br>
+              <a:rPr lang="it-IT" dirty="0"/>
+            </a:br>
+            <a:r>
+              <a:rPr lang="it-IT" sz="2000" dirty="0"/>
+              <a:t>STATES + DIEGUI CLASS</a:t>
+            </a:r>
+          </a:p>
+        </p:txBody>
+      </p:sp>
+      <p:pic>
+        <p:nvPicPr>
+          <p:cNvPr id="5" name="Segnaposto contenuto 4">
+            <a:extLst>
+              <a:ext uri="{FF2B5EF4-FFF2-40B4-BE49-F238E27FC236}">
+                <a16:creationId xmlns:a16="http://schemas.microsoft.com/office/drawing/2014/main" id="{A8FDFD3A-9243-40F4-A25A-8361B16E092F}"/>
+              </a:ext>
+            </a:extLst>
+          </p:cNvPr>
+          <p:cNvPicPr>
+            <a:picLocks noGrp="1" noChangeAspect="1"/>
+          </p:cNvPicPr>
+          <p:nvPr>
+            <p:ph idx="1"/>
+          </p:nvPr>
+        </p:nvPicPr>
+        <p:blipFill>
+          <a:blip r:embed="rId2"/>
+          <a:stretch>
+            <a:fillRect/>
+          </a:stretch>
+        </p:blipFill>
+        <p:spPr>
+          <a:xfrm>
+            <a:off x="834869" y="1790725"/>
+            <a:ext cx="5698792" cy="4681576"/>
+          </a:xfrm>
+        </p:spPr>
+      </p:pic>
+      <p:pic>
+        <p:nvPicPr>
+          <p:cNvPr id="7" name="Immagine 6">
+            <a:extLst>
+              <a:ext uri="{FF2B5EF4-FFF2-40B4-BE49-F238E27FC236}">
+                <a16:creationId xmlns:a16="http://schemas.microsoft.com/office/drawing/2014/main" id="{DA5B5E91-EC33-4569-91A7-DD3C5A27CE38}"/>
+              </a:ext>
+            </a:extLst>
+          </p:cNvPr>
+          <p:cNvPicPr>
+            <a:picLocks noChangeAspect="1"/>
+          </p:cNvPicPr>
+          <p:nvPr/>
+        </p:nvPicPr>
+        <p:blipFill>
+          <a:blip r:embed="rId3"/>
+          <a:stretch>
+            <a:fillRect/>
+          </a:stretch>
+        </p:blipFill>
+        <p:spPr>
+          <a:xfrm>
+            <a:off x="6722419" y="1790725"/>
+            <a:ext cx="4939663" cy="2180220"/>
+          </a:xfrm>
+          <a:prstGeom prst="rect">
+            <a:avLst/>
+          </a:prstGeom>
+        </p:spPr>
+      </p:pic>
+    </p:spTree>
+    <p:extLst>
+      <p:ext uri="{BB962C8B-B14F-4D97-AF65-F5344CB8AC3E}">
+        <p14:creationId xmlns:p14="http://schemas.microsoft.com/office/powerpoint/2010/main" val="451669255"/>
+      </p:ext>
+    </p:extLst>
+  </p:cSld>
+  <p:clrMapOvr>
+    <a:masterClrMapping/>
+  </p:clrMapOvr>
+</p:sld>
+</file>
+
+<file path=ppt/slides/slide19.xml><?xml version="1.0" encoding="utf-8"?>
+<p:sld xmlns:a="http://schemas.openxmlformats.org/drawingml/2006/main" xmlns:r="http://schemas.openxmlformats.org/officeDocument/2006/relationships" xmlns:p="http://schemas.openxmlformats.org/presentationml/2006/main">
+  <p:cSld>
+    <p:spTree>
+      <p:nvGrpSpPr>
+        <p:cNvPr id="1" name=""/>
+        <p:cNvGrpSpPr/>
+        <p:nvPr/>
+      </p:nvGrpSpPr>
+      <p:grpSpPr>
+        <a:xfrm>
+          <a:off x="0" y="0"/>
+          <a:ext cx="0" cy="0"/>
+          <a:chOff x="0" y="0"/>
+          <a:chExt cx="0" cy="0"/>
+        </a:xfrm>
+      </p:grpSpPr>
+      <p:sp>
+        <p:nvSpPr>
+          <p:cNvPr id="2" name="Titolo 1">
+            <a:extLst>
+              <a:ext uri="{FF2B5EF4-FFF2-40B4-BE49-F238E27FC236}">
+                <a16:creationId xmlns:a16="http://schemas.microsoft.com/office/drawing/2014/main" id="{E7507B55-B251-417B-B073-6D6BB02EB34F}"/>
+              </a:ext>
+            </a:extLst>
+          </p:cNvPr>
+          <p:cNvSpPr>
+            <a:spLocks noGrp="1"/>
+          </p:cNvSpPr>
+          <p:nvPr>
+            <p:ph type="title"/>
+          </p:nvPr>
+        </p:nvSpPr>
+        <p:spPr/>
+        <p:txBody>
+          <a:bodyPr/>
+          <a:lstStyle/>
+          <a:p>
+            <a:r>
+              <a:rPr lang="it-IT" dirty="0"/>
+              <a:t>DIAGRAMMA DELLE CLASSI</a:t>
+            </a:r>
+            <a:br>
+              <a:rPr lang="it-IT" dirty="0"/>
+            </a:br>
+            <a:r>
+              <a:rPr lang="it-IT" sz="2000" dirty="0"/>
+              <a:t>STATES</a:t>
+            </a:r>
+          </a:p>
+        </p:txBody>
+      </p:sp>
+      <p:pic>
+        <p:nvPicPr>
+          <p:cNvPr id="6" name="Segnaposto contenuto 5">
+            <a:extLst>
+              <a:ext uri="{FF2B5EF4-FFF2-40B4-BE49-F238E27FC236}">
+                <a16:creationId xmlns:a16="http://schemas.microsoft.com/office/drawing/2014/main" id="{4F4A7A59-6637-47EE-9170-B6A47031ACC2}"/>
+              </a:ext>
+            </a:extLst>
+          </p:cNvPr>
+          <p:cNvPicPr>
+            <a:picLocks noGrp="1" noChangeAspect="1"/>
+          </p:cNvPicPr>
+          <p:nvPr>
+            <p:ph idx="1"/>
+          </p:nvPr>
+        </p:nvPicPr>
+        <p:blipFill>
+          <a:blip r:embed="rId2"/>
+          <a:stretch>
+            <a:fillRect/>
+          </a:stretch>
+        </p:blipFill>
+        <p:spPr>
+          <a:xfrm>
+            <a:off x="792844" y="1853248"/>
+            <a:ext cx="6159977" cy="4750752"/>
+          </a:xfrm>
+        </p:spPr>
+      </p:pic>
+      <p:pic>
+        <p:nvPicPr>
+          <p:cNvPr id="8" name="Immagine 7">
+            <a:extLst>
+              <a:ext uri="{FF2B5EF4-FFF2-40B4-BE49-F238E27FC236}">
+                <a16:creationId xmlns:a16="http://schemas.microsoft.com/office/drawing/2014/main" id="{DB58C406-1C00-4FCE-8A98-1C081BC8D6D8}"/>
+              </a:ext>
+            </a:extLst>
+          </p:cNvPr>
+          <p:cNvPicPr>
+            <a:picLocks noChangeAspect="1"/>
+          </p:cNvPicPr>
+          <p:nvPr/>
+        </p:nvPicPr>
+        <p:blipFill>
+          <a:blip r:embed="rId3"/>
+          <a:stretch>
+            <a:fillRect/>
+          </a:stretch>
+        </p:blipFill>
+        <p:spPr>
+          <a:xfrm>
+            <a:off x="7647293" y="1853248"/>
+            <a:ext cx="3665538" cy="2088061"/>
+          </a:xfrm>
+          <a:prstGeom prst="rect">
+            <a:avLst/>
+          </a:prstGeom>
+        </p:spPr>
+      </p:pic>
+    </p:spTree>
+    <p:extLst>
+      <p:ext uri="{BB962C8B-B14F-4D97-AF65-F5344CB8AC3E}">
+        <p14:creationId xmlns:p14="http://schemas.microsoft.com/office/powerpoint/2010/main" val="1008319195"/>
+      </p:ext>
+    </p:extLst>
+  </p:cSld>
+  <p:clrMapOvr>
+    <a:masterClrMapping/>
+  </p:clrMapOvr>
+</p:sld>
+</file>
+
+<file path=ppt/slides/slide2.xml><?xml version="1.0" encoding="utf-8"?>
+<p:sld xmlns:a="http://schemas.openxmlformats.org/drawingml/2006/main" xmlns:r="http://schemas.openxmlformats.org/officeDocument/2006/relationships" xmlns:p="http://schemas.openxmlformats.org/presentationml/2006/main">
+  <p:cSld>
+    <p:spTree>
+      <p:nvGrpSpPr>
+        <p:cNvPr id="1" name=""/>
+        <p:cNvGrpSpPr/>
+        <p:nvPr/>
+      </p:nvGrpSpPr>
+      <p:grpSpPr>
+        <a:xfrm>
+          <a:off x="0" y="0"/>
+          <a:ext cx="0" cy="0"/>
+          <a:chOff x="0" y="0"/>
+          <a:chExt cx="0" cy="0"/>
+        </a:xfrm>
+      </p:grpSpPr>
+      <p:sp>
+        <p:nvSpPr>
+          <p:cNvPr id="2" name="Titolo 1">
+            <a:extLst>
+              <a:ext uri="{FF2B5EF4-FFF2-40B4-BE49-F238E27FC236}">
+                <a16:creationId xmlns:a16="http://schemas.microsoft.com/office/drawing/2014/main" id="{D37CC97D-09A2-4B4C-B1DA-36A1105EA937}"/>
+              </a:ext>
+            </a:extLst>
+          </p:cNvPr>
+          <p:cNvSpPr>
+            <a:spLocks noGrp="1"/>
+          </p:cNvSpPr>
+          <p:nvPr>
+            <p:ph type="title"/>
+          </p:nvPr>
+        </p:nvSpPr>
+        <p:spPr/>
+        <p:txBody>
+          <a:bodyPr/>
+          <a:lstStyle/>
+          <a:p>
+            <a:r>
+              <a:rPr lang="it-IT" dirty="0"/>
+              <a:t>VISIONE</a:t>
+            </a:r>
+          </a:p>
+        </p:txBody>
+      </p:sp>
+      <p:sp>
+        <p:nvSpPr>
+          <p:cNvPr id="3" name="Segnaposto contenuto 2">
+            <a:extLst>
+              <a:ext uri="{FF2B5EF4-FFF2-40B4-BE49-F238E27FC236}">
+                <a16:creationId xmlns:a16="http://schemas.microsoft.com/office/drawing/2014/main" id="{00A2D16F-611E-4EEA-8D62-AFB72683941B}"/>
+              </a:ext>
+            </a:extLst>
+          </p:cNvPr>
+          <p:cNvSpPr>
+            <a:spLocks noGrp="1"/>
+          </p:cNvSpPr>
+          <p:nvPr>
+            <p:ph idx="1"/>
+          </p:nvPr>
+        </p:nvSpPr>
+        <p:spPr>
+          <a:xfrm>
+            <a:off x="646111" y="1701936"/>
+            <a:ext cx="8946541" cy="4195481"/>
+          </a:xfrm>
+        </p:spPr>
+        <p:txBody>
+          <a:bodyPr>
+            <a:normAutofit fontScale="92500" lnSpcReduction="20000"/>
+          </a:bodyPr>
+          <a:lstStyle/>
+          <a:p>
+            <a:pPr marL="0" indent="0">
+              <a:buNone/>
+            </a:pPr>
+            <a:r>
+              <a:rPr lang="it-IT" dirty="0"/>
+              <a:t>DESCRIZIONE DEL PROGETTO</a:t>
+            </a:r>
+          </a:p>
+          <a:p>
+            <a:endParaRPr lang="it-IT" dirty="0"/>
+          </a:p>
+          <a:p>
+            <a:pPr marL="0" indent="0">
+              <a:buNone/>
+            </a:pPr>
+            <a:r>
+              <a:rPr lang="it-IT" dirty="0"/>
+              <a:t>TRIVIAL PURSUIT</a:t>
+            </a:r>
+          </a:p>
+          <a:p>
+            <a:endParaRPr lang="it-IT" dirty="0"/>
+          </a:p>
+          <a:p>
+            <a:pPr marL="0" indent="0">
+              <a:buNone/>
+            </a:pPr>
+            <a:r>
+              <a:rPr lang="it-IT" dirty="0"/>
+              <a:t>Realizzazione di un applicativo desktop che consenta di giocare a una versione modificata del classico gioco da tavolo </a:t>
+            </a:r>
+            <a:r>
+              <a:rPr lang="it-IT" dirty="0" err="1"/>
+              <a:t>Trivial</a:t>
+            </a:r>
+            <a:r>
+              <a:rPr lang="it-IT" dirty="0"/>
+              <a:t> </a:t>
+            </a:r>
+            <a:r>
+              <a:rPr lang="it-IT" dirty="0" err="1"/>
+              <a:t>Pursuit</a:t>
+            </a:r>
+            <a:r>
+              <a:rPr lang="it-IT" dirty="0"/>
+              <a:t>. Un numero variabile di giocatori deve poter interagire a turno con l’applicativo secondo le regole del gioco.</a:t>
+            </a:r>
+          </a:p>
+          <a:p>
+            <a:pPr marL="0" indent="0">
+              <a:buNone/>
+            </a:pPr>
+            <a:r>
+              <a:rPr lang="it-IT" dirty="0"/>
+              <a:t> Altri elementi: </a:t>
+            </a:r>
+          </a:p>
+          <a:p>
+            <a:r>
+              <a:rPr lang="it-IT" dirty="0"/>
+              <a:t>interazione tramite un’interfaccia </a:t>
+            </a:r>
+            <a:r>
+              <a:rPr lang="it-IT" dirty="0" err="1"/>
+              <a:t>graﬁca</a:t>
+            </a:r>
+            <a:r>
+              <a:rPr lang="it-IT" dirty="0"/>
+              <a:t>;</a:t>
+            </a:r>
+          </a:p>
+          <a:p>
+            <a:r>
+              <a:rPr lang="it-IT" dirty="0"/>
+              <a:t>Partecipazione di più giocatori su un client locale</a:t>
+            </a:r>
+          </a:p>
+          <a:p>
+            <a:r>
+              <a:rPr lang="it-IT" dirty="0"/>
+              <a:t>giocatori remoti (opzionale)</a:t>
+            </a:r>
+          </a:p>
+        </p:txBody>
+      </p:sp>
+    </p:spTree>
+    <p:extLst>
+      <p:ext uri="{BB962C8B-B14F-4D97-AF65-F5344CB8AC3E}">
+        <p14:creationId xmlns:p14="http://schemas.microsoft.com/office/powerpoint/2010/main" val="501245872"/>
+      </p:ext>
+    </p:extLst>
+  </p:cSld>
+  <p:clrMapOvr>
+    <a:masterClrMapping/>
+  </p:clrMapOvr>
+</p:sld>
+</file>
+
+<file path=ppt/slides/slide20.xml><?xml version="1.0" encoding="utf-8"?>
+<p:sld xmlns:a="http://schemas.openxmlformats.org/drawingml/2006/main" xmlns:r="http://schemas.openxmlformats.org/officeDocument/2006/relationships" xmlns:p="http://schemas.openxmlformats.org/presentationml/2006/main">
+  <p:cSld>
+    <p:spTree>
+      <p:nvGrpSpPr>
+        <p:cNvPr id="1" name=""/>
+        <p:cNvGrpSpPr/>
+        <p:nvPr/>
+      </p:nvGrpSpPr>
+      <p:grpSpPr>
+        <a:xfrm>
+          <a:off x="0" y="0"/>
+          <a:ext cx="0" cy="0"/>
+          <a:chOff x="0" y="0"/>
+          <a:chExt cx="0" cy="0"/>
+        </a:xfrm>
+      </p:grpSpPr>
+      <p:sp>
+        <p:nvSpPr>
+          <p:cNvPr id="2" name="Titolo 1">
+            <a:extLst>
+              <a:ext uri="{FF2B5EF4-FFF2-40B4-BE49-F238E27FC236}">
+                <a16:creationId xmlns:a16="http://schemas.microsoft.com/office/drawing/2014/main" id="{2EE0991B-9F1E-41EB-80B5-3086B341D785}"/>
+              </a:ext>
+            </a:extLst>
+          </p:cNvPr>
+          <p:cNvSpPr>
+            <a:spLocks noGrp="1"/>
+          </p:cNvSpPr>
+          <p:nvPr>
+            <p:ph type="title"/>
+          </p:nvPr>
+        </p:nvSpPr>
+        <p:spPr/>
+        <p:txBody>
+          <a:bodyPr/>
+          <a:lstStyle/>
+          <a:p>
+            <a:r>
+              <a:rPr lang="it-IT" dirty="0"/>
+              <a:t>ARCHITETTURE IMPLEMENTATE</a:t>
+            </a:r>
+          </a:p>
+        </p:txBody>
+      </p:sp>
+      <p:sp>
+        <p:nvSpPr>
+          <p:cNvPr id="3" name="Segnaposto contenuto 2">
+            <a:extLst>
+              <a:ext uri="{FF2B5EF4-FFF2-40B4-BE49-F238E27FC236}">
+                <a16:creationId xmlns:a16="http://schemas.microsoft.com/office/drawing/2014/main" id="{067BE700-B2BD-41C4-9F4F-7AC231A1885E}"/>
+              </a:ext>
+            </a:extLst>
+          </p:cNvPr>
+          <p:cNvSpPr>
+            <a:spLocks noGrp="1"/>
+          </p:cNvSpPr>
+          <p:nvPr>
+            <p:ph idx="1"/>
+          </p:nvPr>
+        </p:nvSpPr>
+        <p:spPr>
+          <a:xfrm>
+            <a:off x="646112" y="1526960"/>
+            <a:ext cx="9403742" cy="4721440"/>
+          </a:xfrm>
+        </p:spPr>
+        <p:txBody>
+          <a:bodyPr>
+            <a:normAutofit/>
+          </a:bodyPr>
+          <a:lstStyle/>
+          <a:p>
+            <a:pPr marL="0" indent="0">
+              <a:buNone/>
+            </a:pPr>
+            <a:r>
+              <a:rPr lang="fr-FR" dirty="0"/>
+              <a:t>ARCHITETTURA CLIENT SERVER</a:t>
+            </a:r>
+          </a:p>
+          <a:p>
+            <a:r>
+              <a:rPr lang="fr-FR" dirty="0"/>
+              <a:t>client : @package </a:t>
+            </a:r>
+            <a:r>
+              <a:rPr lang="fr-FR" dirty="0" err="1"/>
+              <a:t>Client.Graphics</a:t>
+            </a:r>
+            <a:endParaRPr lang="fr-FR" dirty="0"/>
+          </a:p>
+          <a:p>
+            <a:r>
+              <a:rPr lang="fr-FR" dirty="0"/>
+              <a:t>server : @package </a:t>
+            </a:r>
+            <a:r>
+              <a:rPr lang="fr-FR" dirty="0" err="1"/>
+              <a:t>Server.GameClasses</a:t>
+            </a:r>
+            <a:r>
+              <a:rPr lang="fr-FR" dirty="0"/>
+              <a:t> </a:t>
+            </a:r>
+          </a:p>
+          <a:p>
+            <a:pPr marL="0" indent="0">
+              <a:buNone/>
+            </a:pPr>
+            <a:r>
+              <a:rPr lang="it-IT" dirty="0"/>
+              <a:t>ARCHITETTURA A STRATI</a:t>
+            </a:r>
+          </a:p>
+          <a:p>
+            <a:pPr marL="0" indent="0">
+              <a:buNone/>
+            </a:pPr>
+            <a:r>
+              <a:rPr lang="it-IT" dirty="0"/>
+              <a:t>all'interno del server :</a:t>
+            </a:r>
+          </a:p>
+          <a:p>
+            <a:r>
+              <a:rPr lang="it-IT" dirty="0"/>
+              <a:t> strato interfaccia al database : @package </a:t>
+            </a:r>
+            <a:r>
+              <a:rPr lang="it-IT" dirty="0" err="1"/>
+              <a:t>ConnectionDb</a:t>
+            </a:r>
+            <a:endParaRPr lang="it-IT" dirty="0"/>
+          </a:p>
+          <a:p>
+            <a:r>
+              <a:rPr lang="it-IT" dirty="0"/>
+              <a:t> strato di dominio : @</a:t>
+            </a:r>
+            <a:r>
+              <a:rPr lang="it-IT" dirty="0" err="1"/>
+              <a:t>paclage</a:t>
+            </a:r>
+            <a:r>
+              <a:rPr lang="it-IT" dirty="0"/>
+              <a:t> </a:t>
+            </a:r>
+            <a:r>
+              <a:rPr lang="it-IT" dirty="0" err="1"/>
+              <a:t>GameClasses</a:t>
+            </a:r>
+            <a:endParaRPr lang="it-IT" dirty="0"/>
+          </a:p>
+          <a:p>
+            <a:r>
+              <a:rPr lang="it-IT" dirty="0"/>
+              <a:t> strato di interfaccia con il client : @classi </a:t>
+            </a:r>
+            <a:r>
+              <a:rPr lang="it-IT" dirty="0" err="1"/>
+              <a:t>ServerInterface</a:t>
+            </a:r>
+            <a:r>
+              <a:rPr lang="it-IT" dirty="0"/>
+              <a:t> e Controller</a:t>
+            </a:r>
+          </a:p>
+          <a:p>
+            <a:pPr marL="0" indent="0">
+              <a:buNone/>
+            </a:pPr>
+            <a:r>
+              <a:rPr lang="it-IT" dirty="0"/>
+              <a:t>all'interno del client :</a:t>
+            </a:r>
+          </a:p>
+          <a:p>
+            <a:r>
+              <a:rPr lang="it-IT" dirty="0"/>
+              <a:t>strato di interfaccia utente : @tutte le classi in client</a:t>
+            </a:r>
+          </a:p>
+          <a:p>
+            <a:r>
+              <a:rPr lang="it-IT" dirty="0"/>
+              <a:t> strato di interfaccia con il server : @classe </a:t>
+            </a:r>
+            <a:r>
+              <a:rPr lang="it-IT" dirty="0" err="1"/>
+              <a:t>ClientInterface</a:t>
+            </a:r>
+            <a:endParaRPr lang="it-IT" dirty="0"/>
+          </a:p>
+        </p:txBody>
+      </p:sp>
+    </p:spTree>
+    <p:extLst>
+      <p:ext uri="{BB962C8B-B14F-4D97-AF65-F5344CB8AC3E}">
+        <p14:creationId xmlns:p14="http://schemas.microsoft.com/office/powerpoint/2010/main" val="17492253"/>
+      </p:ext>
+    </p:extLst>
+  </p:cSld>
+  <p:clrMapOvr>
+    <a:masterClrMapping/>
+  </p:clrMapOvr>
+</p:sld>
+</file>
+
+<file path=ppt/slides/slide21.xml><?xml version="1.0" encoding="utf-8"?>
+<p:sld xmlns:a="http://schemas.openxmlformats.org/drawingml/2006/main" xmlns:r="http://schemas.openxmlformats.org/officeDocument/2006/relationships" xmlns:p="http://schemas.openxmlformats.org/presentationml/2006/main">
+  <p:cSld>
+    <p:spTree>
+      <p:nvGrpSpPr>
+        <p:cNvPr id="1" name=""/>
+        <p:cNvGrpSpPr/>
+        <p:nvPr/>
+      </p:nvGrpSpPr>
+      <p:grpSpPr>
+        <a:xfrm>
+          <a:off x="0" y="0"/>
+          <a:ext cx="0" cy="0"/>
+          <a:chOff x="0" y="0"/>
+          <a:chExt cx="0" cy="0"/>
+        </a:xfrm>
+      </p:grpSpPr>
+      <p:sp>
+        <p:nvSpPr>
+          <p:cNvPr id="2" name="Titolo 1">
+            <a:extLst>
+              <a:ext uri="{FF2B5EF4-FFF2-40B4-BE49-F238E27FC236}">
                 <a16:creationId xmlns:a16="http://schemas.microsoft.com/office/drawing/2014/main" id="{C02CC145-D45E-462B-BB87-B7543087191E}"/>
               </a:ext>
             </a:extLst>
@@ -7121,7 +7766,7 @@
 </p:sld>
 </file>
 
-<file path=ppt/slides/slide18.xml><?xml version="1.0" encoding="utf-8"?>
+<file path=ppt/slides/slide22.xml><?xml version="1.0" encoding="utf-8"?>
 <p:sld xmlns:a="http://schemas.openxmlformats.org/drawingml/2006/main" xmlns:r="http://schemas.openxmlformats.org/officeDocument/2006/relationships" xmlns:p="http://schemas.openxmlformats.org/presentationml/2006/main">
   <p:cSld>
     <p:spTree>
@@ -7333,7 +7978,7 @@
 </p:sld>
 </file>
 
-<file path=ppt/slides/slide19.xml><?xml version="1.0" encoding="utf-8"?>
+<file path=ppt/slides/slide23.xml><?xml version="1.0" encoding="utf-8"?>
 <p:sld xmlns:a="http://schemas.openxmlformats.org/drawingml/2006/main" xmlns:r="http://schemas.openxmlformats.org/officeDocument/2006/relationships" xmlns:p="http://schemas.openxmlformats.org/presentationml/2006/main">
   <p:cSld>
     <p:spTree>
@@ -7469,178 +8114,7 @@
 </p:sld>
 </file>
 
-<file path=ppt/slides/slide2.xml><?xml version="1.0" encoding="utf-8"?>
-<p:sld xmlns:a="http://schemas.openxmlformats.org/drawingml/2006/main" xmlns:r="http://schemas.openxmlformats.org/officeDocument/2006/relationships" xmlns:p="http://schemas.openxmlformats.org/presentationml/2006/main">
-  <p:cSld>
-    <p:spTree>
-      <p:nvGrpSpPr>
-        <p:cNvPr id="1" name=""/>
-        <p:cNvGrpSpPr/>
-        <p:nvPr/>
-      </p:nvGrpSpPr>
-      <p:grpSpPr>
-        <a:xfrm>
-          <a:off x="0" y="0"/>
-          <a:ext cx="0" cy="0"/>
-          <a:chOff x="0" y="0"/>
-          <a:chExt cx="0" cy="0"/>
-        </a:xfrm>
-      </p:grpSpPr>
-      <p:sp>
-        <p:nvSpPr>
-          <p:cNvPr id="2" name="Titolo 1">
-            <a:extLst>
-              <a:ext uri="{FF2B5EF4-FFF2-40B4-BE49-F238E27FC236}">
-                <a16:creationId xmlns:a16="http://schemas.microsoft.com/office/drawing/2014/main" id="{D37CC97D-09A2-4B4C-B1DA-36A1105EA937}"/>
-              </a:ext>
-            </a:extLst>
-          </p:cNvPr>
-          <p:cNvSpPr>
-            <a:spLocks noGrp="1"/>
-          </p:cNvSpPr>
-          <p:nvPr>
-            <p:ph type="title"/>
-          </p:nvPr>
-        </p:nvSpPr>
-        <p:spPr/>
-        <p:txBody>
-          <a:bodyPr/>
-          <a:lstStyle/>
-          <a:p>
-            <a:r>
-              <a:rPr lang="it-IT" dirty="0"/>
-              <a:t>VISIONE</a:t>
-            </a:r>
-          </a:p>
-        </p:txBody>
-      </p:sp>
-      <p:sp>
-        <p:nvSpPr>
-          <p:cNvPr id="3" name="Segnaposto contenuto 2">
-            <a:extLst>
-              <a:ext uri="{FF2B5EF4-FFF2-40B4-BE49-F238E27FC236}">
-                <a16:creationId xmlns:a16="http://schemas.microsoft.com/office/drawing/2014/main" id="{00A2D16F-611E-4EEA-8D62-AFB72683941B}"/>
-              </a:ext>
-            </a:extLst>
-          </p:cNvPr>
-          <p:cNvSpPr>
-            <a:spLocks noGrp="1"/>
-          </p:cNvSpPr>
-          <p:nvPr>
-            <p:ph idx="1"/>
-          </p:nvPr>
-        </p:nvSpPr>
-        <p:spPr>
-          <a:xfrm>
-            <a:off x="646111" y="1701936"/>
-            <a:ext cx="8946541" cy="4195481"/>
-          </a:xfrm>
-        </p:spPr>
-        <p:txBody>
-          <a:bodyPr>
-            <a:normAutofit fontScale="92500" lnSpcReduction="20000"/>
-          </a:bodyPr>
-          <a:lstStyle/>
-          <a:p>
-            <a:pPr marL="0" indent="0">
-              <a:buNone/>
-            </a:pPr>
-            <a:r>
-              <a:rPr lang="it-IT" dirty="0"/>
-              <a:t>DESCRIZIONE DEL PROGETTO</a:t>
-            </a:r>
-          </a:p>
-          <a:p>
-            <a:endParaRPr lang="it-IT" dirty="0"/>
-          </a:p>
-          <a:p>
-            <a:pPr marL="0" indent="0">
-              <a:buNone/>
-            </a:pPr>
-            <a:r>
-              <a:rPr lang="it-IT" dirty="0"/>
-              <a:t>TRIVIAL PURSUIT</a:t>
-            </a:r>
-          </a:p>
-          <a:p>
-            <a:endParaRPr lang="it-IT" dirty="0"/>
-          </a:p>
-          <a:p>
-            <a:pPr marL="0" indent="0">
-              <a:buNone/>
-            </a:pPr>
-            <a:r>
-              <a:rPr lang="it-IT" dirty="0"/>
-              <a:t>Realizzazione di un applicativo desktop che consenta di giocare a una versione modificata del classico gioco da tavolo </a:t>
-            </a:r>
-            <a:r>
-              <a:rPr lang="it-IT" dirty="0" err="1"/>
-              <a:t>Trivial</a:t>
-            </a:r>
-            <a:r>
-              <a:rPr lang="it-IT" dirty="0"/>
-              <a:t> </a:t>
-            </a:r>
-            <a:r>
-              <a:rPr lang="it-IT" dirty="0" err="1"/>
-              <a:t>Pursuit</a:t>
-            </a:r>
-            <a:r>
-              <a:rPr lang="it-IT" dirty="0"/>
-              <a:t>. Un numero variabile di giocatori deve poter interagire a turno con l’applicativo secondo le regole del gioco.</a:t>
-            </a:r>
-          </a:p>
-          <a:p>
-            <a:pPr marL="0" indent="0">
-              <a:buNone/>
-            </a:pPr>
-            <a:r>
-              <a:rPr lang="it-IT" dirty="0"/>
-              <a:t> Altri elementi: </a:t>
-            </a:r>
-          </a:p>
-          <a:p>
-            <a:r>
-              <a:rPr lang="it-IT" dirty="0"/>
-              <a:t>interazione tramite un’interfaccia </a:t>
-            </a:r>
-            <a:r>
-              <a:rPr lang="it-IT" dirty="0" err="1"/>
-              <a:t>graﬁca</a:t>
-            </a:r>
-            <a:r>
-              <a:rPr lang="it-IT" dirty="0"/>
-              <a:t>;</a:t>
-            </a:r>
-          </a:p>
-          <a:p>
-            <a:r>
-              <a:rPr lang="it-IT" dirty="0"/>
-              <a:t>Partecipazione di più giocatori su un client locale</a:t>
-            </a:r>
-          </a:p>
-          <a:p>
-            <a:r>
-              <a:rPr lang="it-IT" dirty="0"/>
-              <a:t>giocatori remoti (opzionale)</a:t>
-            </a:r>
-          </a:p>
-        </p:txBody>
-      </p:sp>
-    </p:spTree>
-    <p:extLst>
-      <p:ext uri="{BB962C8B-B14F-4D97-AF65-F5344CB8AC3E}">
-        <p14:creationId xmlns:p14="http://schemas.microsoft.com/office/powerpoint/2010/main" val="501245872"/>
-      </p:ext>
-    </p:extLst>
-  </p:cSld>
-  <p:clrMapOvr>
-    <a:masterClrMapping/>
-  </p:clrMapOvr>
-</p:sld>
-</file>
-
-<file path=ppt/slides/slide20.xml><?xml version="1.0" encoding="utf-8"?>
+<file path=ppt/slides/slide24.xml><?xml version="1.0" encoding="utf-8"?>
 <p:sld xmlns:a="http://schemas.openxmlformats.org/drawingml/2006/main" xmlns:r="http://schemas.openxmlformats.org/officeDocument/2006/relationships" xmlns:p="http://schemas.openxmlformats.org/presentationml/2006/main">
   <p:cSld>
     <p:spTree>
@@ -7782,7 +8256,7 @@
 </p:sld>
 </file>
 
-<file path=ppt/slides/slide21.xml><?xml version="1.0" encoding="utf-8"?>
+<file path=ppt/slides/slide25.xml><?xml version="1.0" encoding="utf-8"?>
 <p:sld xmlns:a="http://schemas.openxmlformats.org/drawingml/2006/main" xmlns:r="http://schemas.openxmlformats.org/officeDocument/2006/relationships" xmlns:p="http://schemas.openxmlformats.org/presentationml/2006/main">
   <p:cSld>
     <p:spTree>

</xml_diff>